<commit_message>
doc: update endpoint_state.pptx for response::error()
</commit_message>
<xml_diff>
--- a/docs/endpoint_state.pptx
+++ b/docs/endpoint_state.pptx
@@ -7,9 +7,8 @@
   <p:sldIdLst>
     <p:sldId id="256" r:id="rId2"/>
     <p:sldId id="257" r:id="rId3"/>
-    <p:sldId id="258" r:id="rId4"/>
-    <p:sldId id="261" r:id="rId5"/>
-    <p:sldId id="260" r:id="rId6"/>
+    <p:sldId id="261" r:id="rId4"/>
+    <p:sldId id="260" r:id="rId5"/>
   </p:sldIdLst>
   <p:sldSz cx="12192000" cy="6858000"/>
   <p:notesSz cx="6858000" cy="9144000"/>
@@ -263,7 +262,7 @@
           <a:p>
             <a:fld id="{B8236F12-0300-4A06-BDE9-8003C6A32EE1}" type="datetimeFigureOut">
               <a:rPr kumimoji="1" lang="ja-JP" altLang="en-US" smtClean="0"/>
-              <a:t>2021/10/4</a:t>
+              <a:t>2023/11/24</a:t>
             </a:fld>
             <a:endParaRPr kumimoji="1" lang="ja-JP" altLang="en-US"/>
           </a:p>
@@ -493,7 +492,7 @@
           <a:p>
             <a:fld id="{B8236F12-0300-4A06-BDE9-8003C6A32EE1}" type="datetimeFigureOut">
               <a:rPr kumimoji="1" lang="ja-JP" altLang="en-US" smtClean="0"/>
-              <a:t>2021/10/4</a:t>
+              <a:t>2023/11/24</a:t>
             </a:fld>
             <a:endParaRPr kumimoji="1" lang="ja-JP" altLang="en-US"/>
           </a:p>
@@ -733,7 +732,7 @@
           <a:p>
             <a:fld id="{B8236F12-0300-4A06-BDE9-8003C6A32EE1}" type="datetimeFigureOut">
               <a:rPr kumimoji="1" lang="ja-JP" altLang="en-US" smtClean="0"/>
-              <a:t>2021/10/4</a:t>
+              <a:t>2023/11/24</a:t>
             </a:fld>
             <a:endParaRPr kumimoji="1" lang="ja-JP" altLang="en-US"/>
           </a:p>
@@ -963,7 +962,7 @@
           <a:p>
             <a:fld id="{B8236F12-0300-4A06-BDE9-8003C6A32EE1}" type="datetimeFigureOut">
               <a:rPr kumimoji="1" lang="ja-JP" altLang="en-US" smtClean="0"/>
-              <a:t>2021/10/4</a:t>
+              <a:t>2023/11/24</a:t>
             </a:fld>
             <a:endParaRPr kumimoji="1" lang="ja-JP" altLang="en-US"/>
           </a:p>
@@ -1238,7 +1237,7 @@
           <a:p>
             <a:fld id="{B8236F12-0300-4A06-BDE9-8003C6A32EE1}" type="datetimeFigureOut">
               <a:rPr kumimoji="1" lang="ja-JP" altLang="en-US" smtClean="0"/>
-              <a:t>2021/10/4</a:t>
+              <a:t>2023/11/24</a:t>
             </a:fld>
             <a:endParaRPr kumimoji="1" lang="ja-JP" altLang="en-US"/>
           </a:p>
@@ -1567,7 +1566,7 @@
           <a:p>
             <a:fld id="{B8236F12-0300-4A06-BDE9-8003C6A32EE1}" type="datetimeFigureOut">
               <a:rPr kumimoji="1" lang="ja-JP" altLang="en-US" smtClean="0"/>
-              <a:t>2021/10/4</a:t>
+              <a:t>2023/11/24</a:t>
             </a:fld>
             <a:endParaRPr kumimoji="1" lang="ja-JP" altLang="en-US"/>
           </a:p>
@@ -2043,7 +2042,7 @@
           <a:p>
             <a:fld id="{B8236F12-0300-4A06-BDE9-8003C6A32EE1}" type="datetimeFigureOut">
               <a:rPr kumimoji="1" lang="ja-JP" altLang="en-US" smtClean="0"/>
-              <a:t>2021/10/4</a:t>
+              <a:t>2023/11/24</a:t>
             </a:fld>
             <a:endParaRPr kumimoji="1" lang="ja-JP" altLang="en-US"/>
           </a:p>
@@ -2184,7 +2183,7 @@
           <a:p>
             <a:fld id="{B8236F12-0300-4A06-BDE9-8003C6A32EE1}" type="datetimeFigureOut">
               <a:rPr kumimoji="1" lang="ja-JP" altLang="en-US" smtClean="0"/>
-              <a:t>2021/10/4</a:t>
+              <a:t>2023/11/24</a:t>
             </a:fld>
             <a:endParaRPr kumimoji="1" lang="ja-JP" altLang="en-US"/>
           </a:p>
@@ -2297,7 +2296,7 @@
           <a:p>
             <a:fld id="{B8236F12-0300-4A06-BDE9-8003C6A32EE1}" type="datetimeFigureOut">
               <a:rPr kumimoji="1" lang="ja-JP" altLang="en-US" smtClean="0"/>
-              <a:t>2021/10/4</a:t>
+              <a:t>2023/11/24</a:t>
             </a:fld>
             <a:endParaRPr kumimoji="1" lang="ja-JP" altLang="en-US"/>
           </a:p>
@@ -2640,7 +2639,7 @@
           <a:p>
             <a:fld id="{B8236F12-0300-4A06-BDE9-8003C6A32EE1}" type="datetimeFigureOut">
               <a:rPr kumimoji="1" lang="ja-JP" altLang="en-US" smtClean="0"/>
-              <a:t>2021/10/4</a:t>
+              <a:t>2023/11/24</a:t>
             </a:fld>
             <a:endParaRPr kumimoji="1" lang="ja-JP" altLang="en-US"/>
           </a:p>
@@ -2928,7 +2927,7 @@
           <a:p>
             <a:fld id="{B8236F12-0300-4A06-BDE9-8003C6A32EE1}" type="datetimeFigureOut">
               <a:rPr kumimoji="1" lang="ja-JP" altLang="en-US" smtClean="0"/>
-              <a:t>2021/10/4</a:t>
+              <a:t>2023/11/24</a:t>
             </a:fld>
             <a:endParaRPr kumimoji="1" lang="ja-JP" altLang="en-US"/>
           </a:p>
@@ -3201,7 +3200,7 @@
           <a:p>
             <a:fld id="{B8236F12-0300-4A06-BDE9-8003C6A32EE1}" type="datetimeFigureOut">
               <a:rPr kumimoji="1" lang="ja-JP" altLang="en-US" smtClean="0"/>
-              <a:t>2021/10/4</a:t>
+              <a:t>2023/11/24</a:t>
             </a:fld>
             <a:endParaRPr kumimoji="1" lang="ja-JP" altLang="en-US"/>
           </a:p>
@@ -4284,8 +4283,8 @@
         </p:nvSpPr>
         <p:spPr>
           <a:xfrm>
-            <a:off x="7636528" y="3410404"/>
-            <a:ext cx="1843648" cy="276999"/>
+            <a:off x="7595347" y="3050115"/>
+            <a:ext cx="1843648" cy="646331"/>
           </a:xfrm>
           <a:prstGeom prst="rect">
             <a:avLst/>
@@ -4306,7 +4305,37 @@
               <a:rPr kumimoji="1" lang="en-US" altLang="ja-JP" sz="1200" dirty="0"/>
               <a:t>esponse::body()</a:t>
             </a:r>
-            <a:endParaRPr kumimoji="1" lang="ja-JP" altLang="en-US" sz="1200" dirty="0"/>
+            <a:br>
+              <a:rPr kumimoji="1" lang="en-US" altLang="ja-JP" sz="1200" dirty="0"/>
+            </a:br>
+            <a:r>
+              <a:rPr kumimoji="1" lang="ja-JP" altLang="en-US" sz="1200" dirty="0">
+                <a:solidFill>
+                  <a:srgbClr val="FF0000"/>
+                </a:solidFill>
+              </a:rPr>
+              <a:t>または</a:t>
+            </a:r>
+            <a:endParaRPr kumimoji="1" lang="en-US" altLang="ja-JP" sz="1200" dirty="0">
+              <a:solidFill>
+                <a:srgbClr val="FF0000"/>
+              </a:solidFill>
+            </a:endParaRPr>
+          </a:p>
+          <a:p>
+            <a:r>
+              <a:rPr lang="en-US" altLang="ja-JP" sz="1200" dirty="0">
+                <a:solidFill>
+                  <a:srgbClr val="FF0000"/>
+                </a:solidFill>
+              </a:rPr>
+              <a:t>response::error()</a:t>
+            </a:r>
+            <a:endParaRPr kumimoji="1" lang="ja-JP" altLang="en-US" sz="1200" dirty="0">
+              <a:solidFill>
+                <a:srgbClr val="FF0000"/>
+              </a:solidFill>
+            </a:endParaRPr>
           </a:p>
         </p:txBody>
       </p:sp>
@@ -4452,8 +4481,8 @@
         </p:nvSpPr>
         <p:spPr>
           <a:xfrm>
-            <a:off x="5792880" y="2272553"/>
-            <a:ext cx="1843648" cy="276999"/>
+            <a:off x="5089401" y="2272553"/>
+            <a:ext cx="3391376" cy="276999"/>
           </a:xfrm>
           <a:prstGeom prst="rect">
             <a:avLst/>
@@ -4472,9 +4501,29 @@
             </a:r>
             <a:r>
               <a:rPr kumimoji="1" lang="en-US" altLang="ja-JP" sz="1200" dirty="0"/>
-              <a:t>esponse::body()</a:t>
-            </a:r>
-            <a:endParaRPr kumimoji="1" lang="ja-JP" altLang="en-US" sz="1200" dirty="0"/>
+              <a:t>esponse::body() </a:t>
+            </a:r>
+            <a:r>
+              <a:rPr kumimoji="1" lang="ja-JP" altLang="en-US" sz="1200" dirty="0">
+                <a:solidFill>
+                  <a:srgbClr val="FF0000"/>
+                </a:solidFill>
+              </a:rPr>
+              <a:t>または </a:t>
+            </a:r>
+            <a:r>
+              <a:rPr kumimoji="1" lang="en-US" altLang="ja-JP" sz="1200" dirty="0">
+                <a:solidFill>
+                  <a:srgbClr val="FF0000"/>
+                </a:solidFill>
+              </a:rPr>
+              <a:t>response::error()</a:t>
+            </a:r>
+            <a:endParaRPr kumimoji="1" lang="ja-JP" altLang="en-US" sz="1200" dirty="0">
+              <a:solidFill>
+                <a:srgbClr val="FF0000"/>
+              </a:solidFill>
+            </a:endParaRPr>
           </a:p>
         </p:txBody>
       </p:sp>
@@ -4586,7 +4635,11 @@
           <a:lstStyle/>
           <a:p>
             <a:r>
-              <a:rPr lang="en-US" altLang="ja-JP" sz="1200" dirty="0"/>
+              <a:rPr lang="en-US" altLang="ja-JP" sz="1200" strike="sngStrike" dirty="0">
+                <a:solidFill>
+                  <a:srgbClr val="FF0000"/>
+                </a:solidFill>
+              </a:rPr>
               <a:t>response::code()</a:t>
             </a:r>
           </a:p>
@@ -4802,8 +4855,8 @@
         </p:nvSpPr>
         <p:spPr>
           <a:xfrm>
-            <a:off x="8517171" y="4383071"/>
-            <a:ext cx="3674821" cy="2308324"/>
+            <a:off x="8065829" y="4419465"/>
+            <a:ext cx="4126164" cy="2492990"/>
           </a:xfrm>
           <a:prstGeom prst="rect">
             <a:avLst/>
@@ -4824,10 +4877,35 @@
               <a:rPr lang="ja-JP" altLang="en-US" sz="1200" b="1" dirty="0"/>
               <a:t>を含めレスポンス・アプリ出力の送信がすべて完了した状態</a:t>
             </a:r>
-            <a:endParaRPr lang="en-US" altLang="ja-JP" sz="1200" b="1" dirty="0"/>
-          </a:p>
-          <a:p>
-            <a:endParaRPr kumimoji="1" lang="en-US" altLang="ja-JP" sz="1200" dirty="0"/>
+            <a:r>
+              <a:rPr lang="en-US" altLang="ja-JP" sz="1200" dirty="0">
+                <a:solidFill>
+                  <a:srgbClr val="FF0000"/>
+                </a:solidFill>
+              </a:rPr>
+              <a:t>(</a:t>
+            </a:r>
+            <a:r>
+              <a:rPr lang="ja-JP" altLang="en-US" sz="1200" dirty="0">
+                <a:solidFill>
+                  <a:srgbClr val="FF0000"/>
+                </a:solidFill>
+              </a:rPr>
+              <a:t>エラーによる完了を含む</a:t>
+            </a:r>
+            <a:r>
+              <a:rPr lang="en-US" altLang="ja-JP" sz="1200" dirty="0">
+                <a:solidFill>
+                  <a:srgbClr val="FF0000"/>
+                </a:solidFill>
+              </a:rPr>
+              <a:t>)</a:t>
+            </a:r>
+            <a:endParaRPr kumimoji="1" lang="en-US" altLang="ja-JP" sz="1200" dirty="0">
+              <a:solidFill>
+                <a:srgbClr val="FF0000"/>
+              </a:solidFill>
+            </a:endParaRPr>
           </a:p>
           <a:p>
             <a:r>
@@ -4838,8 +4916,62 @@
           </a:p>
           <a:p>
             <a:r>
-              <a:rPr lang="en-US" altLang="ja-JP" sz="1200" dirty="0"/>
-              <a:t>code, body</a:t>
+              <a:rPr lang="en-US" altLang="ja-JP" sz="1200" strike="sngStrike" dirty="0">
+                <a:solidFill>
+                  <a:srgbClr val="FF0000"/>
+                </a:solidFill>
+              </a:rPr>
+              <a:t>code,</a:t>
+            </a:r>
+            <a:r>
+              <a:rPr lang="en-US" altLang="ja-JP" sz="1200" dirty="0">
+                <a:solidFill>
+                  <a:srgbClr val="FF0000"/>
+                </a:solidFill>
+              </a:rPr>
+              <a:t> </a:t>
+            </a:r>
+          </a:p>
+          <a:p>
+            <a:r>
+              <a:rPr lang="en-US" altLang="ja-JP" sz="1200" dirty="0">
+                <a:solidFill>
+                  <a:srgbClr val="FF0000"/>
+                </a:solidFill>
+              </a:rPr>
+              <a:t>body (</a:t>
+            </a:r>
+            <a:r>
+              <a:rPr lang="ja-JP" altLang="en-US" sz="1200" dirty="0">
+                <a:solidFill>
+                  <a:srgbClr val="FF0000"/>
+                </a:solidFill>
+              </a:rPr>
+              <a:t>成功の場合</a:t>
+            </a:r>
+            <a:r>
+              <a:rPr lang="en-US" altLang="ja-JP" sz="1200" dirty="0">
+                <a:solidFill>
+                  <a:srgbClr val="FF0000"/>
+                </a:solidFill>
+              </a:rPr>
+              <a:t>), error (</a:t>
+            </a:r>
+            <a:r>
+              <a:rPr lang="ja-JP" altLang="en-US" sz="1200" dirty="0">
+                <a:solidFill>
+                  <a:srgbClr val="FF0000"/>
+                </a:solidFill>
+              </a:rPr>
+              <a:t>エラーの場合</a:t>
+            </a:r>
+            <a:r>
+              <a:rPr lang="en-US" altLang="ja-JP" sz="1200" dirty="0">
+                <a:solidFill>
+                  <a:srgbClr val="FF0000"/>
+                </a:solidFill>
+              </a:rPr>
+              <a:t>)</a:t>
             </a:r>
           </a:p>
           <a:p>
@@ -4847,18 +4979,50 @@
           </a:p>
           <a:p>
             <a:r>
-              <a:rPr lang="ja-JP" altLang="en-US" sz="1200" dirty="0"/>
+              <a:rPr lang="ja-JP" altLang="en-US" sz="1200" dirty="0">
+                <a:solidFill>
+                  <a:srgbClr val="FF0000"/>
+                </a:solidFill>
+              </a:rPr>
               <a:t>成功とエラーは</a:t>
             </a:r>
             <a:r>
-              <a:rPr lang="en-US" altLang="ja-JP" sz="1200" dirty="0"/>
-              <a:t>code</a:t>
-            </a:r>
-            <a:r>
-              <a:rPr lang="ja-JP" altLang="en-US" sz="1200" dirty="0"/>
-              <a:t>によって区別される</a:t>
-            </a:r>
-            <a:endParaRPr lang="en-US" altLang="ja-JP" sz="1200" dirty="0"/>
+              <a:rPr lang="en-US" altLang="ja-JP" sz="1200" dirty="0">
+                <a:solidFill>
+                  <a:srgbClr val="FF0000"/>
+                </a:solidFill>
+              </a:rPr>
+              <a:t>body()</a:t>
+            </a:r>
+            <a:r>
+              <a:rPr lang="ja-JP" altLang="en-US" sz="1200" dirty="0">
+                <a:solidFill>
+                  <a:srgbClr val="FF0000"/>
+                </a:solidFill>
+              </a:rPr>
+              <a:t>呼び出しか</a:t>
+            </a:r>
+            <a:r>
+              <a:rPr lang="en-US" altLang="ja-JP" sz="1200" dirty="0">
+                <a:solidFill>
+                  <a:srgbClr val="FF0000"/>
+                </a:solidFill>
+              </a:rPr>
+              <a:t>error()</a:t>
+            </a:r>
+            <a:r>
+              <a:rPr lang="ja-JP" altLang="en-US" sz="1200" dirty="0">
+                <a:solidFill>
+                  <a:srgbClr val="FF0000"/>
+                </a:solidFill>
+              </a:rPr>
+              <a:t>呼び出しかによって区別される</a:t>
+            </a:r>
+            <a:endParaRPr lang="en-US" altLang="ja-JP" sz="1200" dirty="0">
+              <a:solidFill>
+                <a:srgbClr val="FF0000"/>
+              </a:solidFill>
+            </a:endParaRPr>
           </a:p>
           <a:p>
             <a:endParaRPr lang="en-US" altLang="ja-JP" sz="1200" dirty="0"/>
@@ -4876,23 +5040,51 @@
               <a:t>- </a:t>
             </a:r>
             <a:r>
-              <a:rPr lang="ja-JP" altLang="en-US" sz="1200" dirty="0"/>
+              <a:rPr lang="ja-JP" altLang="en-US" sz="1200" strike="sngStrike" dirty="0">
+                <a:solidFill>
+                  <a:srgbClr val="FF0000"/>
+                </a:solidFill>
+              </a:rPr>
               <a:t>この状態に遷移前に</a:t>
             </a:r>
             <a:r>
+              <a:rPr lang="en-US" altLang="ja-JP" sz="1200" strike="sngStrike" dirty="0">
+                <a:solidFill>
+                  <a:srgbClr val="FF0000"/>
+                </a:solidFill>
+              </a:rPr>
+              <a:t>code()</a:t>
+            </a:r>
+            <a:r>
+              <a:rPr lang="ja-JP" altLang="en-US" sz="1200" strike="sngStrike" dirty="0">
+                <a:solidFill>
+                  <a:srgbClr val="FF0000"/>
+                </a:solidFill>
+              </a:rPr>
+              <a:t>が呼ばれていること</a:t>
+            </a:r>
+            <a:endParaRPr lang="en-US" altLang="ja-JP" sz="1200" strike="sngStrike" dirty="0">
+              <a:solidFill>
+                <a:srgbClr val="FF0000"/>
+              </a:solidFill>
+            </a:endParaRPr>
+          </a:p>
+          <a:p>
+            <a:r>
               <a:rPr lang="en-US" altLang="ja-JP" sz="1200" dirty="0"/>
-              <a:t>code()</a:t>
-            </a:r>
-            <a:r>
-              <a:rPr lang="ja-JP" altLang="en-US" sz="1200" dirty="0"/>
-              <a:t>が呼ばれていること</a:t>
-            </a:r>
-            <a:endParaRPr lang="en-US" altLang="ja-JP" sz="1200" dirty="0"/>
-          </a:p>
-          <a:p>
+              <a:t>-</a:t>
+            </a:r>
+            <a:r>
+              <a:rPr lang="ja-JP" altLang="en-US" sz="1200" dirty="0">
+                <a:solidFill>
+                  <a:srgbClr val="FF0000"/>
+                </a:solidFill>
+              </a:rPr>
+              <a:t>成功の場合</a:t>
+            </a:r>
             <a:r>
               <a:rPr lang="en-US" altLang="ja-JP" sz="1200" dirty="0"/>
-              <a:t>- acquire</a:t>
+              <a:t>acquire</a:t>
             </a:r>
             <a:r>
               <a:rPr lang="ja-JP" altLang="en-US" sz="1200" dirty="0"/>
@@ -4912,9 +5104,100 @@
             </a:r>
             <a:r>
               <a:rPr lang="ja-JP" altLang="en-US" sz="1200" dirty="0"/>
-              <a:t>されている事</a:t>
-            </a:r>
-            <a:endParaRPr lang="en-US" altLang="ja-JP" sz="1200" dirty="0"/>
+              <a:t>されている事 </a:t>
+            </a:r>
+            <a:r>
+              <a:rPr lang="en-US" altLang="ja-JP" sz="1200" dirty="0">
+                <a:solidFill>
+                  <a:srgbClr val="FF0000"/>
+                </a:solidFill>
+              </a:rPr>
+              <a:t>(</a:t>
+            </a:r>
+            <a:r>
+              <a:rPr lang="ja-JP" altLang="en-US" sz="1200" dirty="0">
+                <a:solidFill>
+                  <a:srgbClr val="FF0000"/>
+                </a:solidFill>
+              </a:rPr>
+              <a:t>エラーの場合は</a:t>
+            </a:r>
+            <a:r>
+              <a:rPr lang="en-US" altLang="ja-JP" sz="1200" dirty="0">
+                <a:solidFill>
+                  <a:srgbClr val="FF0000"/>
+                </a:solidFill>
+              </a:rPr>
+              <a:t>best effort</a:t>
+            </a:r>
+            <a:r>
+              <a:rPr lang="ja-JP" altLang="en-US" sz="1200" dirty="0">
+                <a:solidFill>
+                  <a:srgbClr val="FF0000"/>
+                </a:solidFill>
+              </a:rPr>
+              <a:t>で</a:t>
+            </a:r>
+            <a:r>
+              <a:rPr lang="en-US" altLang="ja-JP" sz="1200" dirty="0">
+                <a:solidFill>
+                  <a:srgbClr val="FF0000"/>
+                </a:solidFill>
+              </a:rPr>
+              <a:t>release)</a:t>
+            </a:r>
+          </a:p>
+        </p:txBody>
+      </p:sp>
+      <p:sp>
+        <p:nvSpPr>
+          <p:cNvPr id="3" name="テキスト ボックス 2">
+            <a:extLst>
+              <a:ext uri="{FF2B5EF4-FFF2-40B4-BE49-F238E27FC236}">
+                <a16:creationId xmlns:a16="http://schemas.microsoft.com/office/drawing/2014/main" id="{81A5D88C-A704-A412-D5FB-1BD8559A9B11}"/>
+              </a:ext>
+            </a:extLst>
+          </p:cNvPr>
+          <p:cNvSpPr txBox="1"/>
+          <p:nvPr/>
+        </p:nvSpPr>
+        <p:spPr>
+          <a:xfrm>
+            <a:off x="135660" y="6374813"/>
+            <a:ext cx="5900879" cy="276999"/>
+          </a:xfrm>
+          <a:prstGeom prst="rect">
+            <a:avLst/>
+          </a:prstGeom>
+          <a:noFill/>
+        </p:spPr>
+        <p:txBody>
+          <a:bodyPr wrap="square" rtlCol="0">
+            <a:spAutoFit/>
+          </a:bodyPr>
+          <a:lstStyle/>
+          <a:p>
+            <a:r>
+              <a:rPr lang="en-US" altLang="ja-JP" sz="1200" dirty="0">
+                <a:solidFill>
+                  <a:srgbClr val="FF0000"/>
+                </a:solidFill>
+              </a:rPr>
+              <a:t>response::error()</a:t>
+            </a:r>
+            <a:r>
+              <a:rPr lang="ja-JP" altLang="en-US" sz="1200" dirty="0">
+                <a:solidFill>
+                  <a:srgbClr val="FF0000"/>
+                </a:solidFill>
+              </a:rPr>
+              <a:t>の追加による変更を赤字で示す</a:t>
+            </a:r>
+            <a:endParaRPr kumimoji="1" lang="ja-JP" altLang="en-US" sz="1200" dirty="0">
+              <a:solidFill>
+                <a:srgbClr val="FF0000"/>
+              </a:solidFill>
+            </a:endParaRPr>
           </a:p>
         </p:txBody>
       </p:sp>
@@ -4953,312 +5236,6 @@
           <p:cNvPr id="2" name="タイトル 1">
             <a:extLst>
               <a:ext uri="{FF2B5EF4-FFF2-40B4-BE49-F238E27FC236}">
-                <a16:creationId xmlns:a16="http://schemas.microsoft.com/office/drawing/2014/main" id="{47B9951B-7193-41A4-9AA6-4914C0A0C53C}"/>
-              </a:ext>
-            </a:extLst>
-          </p:cNvPr>
-          <p:cNvSpPr>
-            <a:spLocks noGrp="1"/>
-          </p:cNvSpPr>
-          <p:nvPr>
-            <p:ph type="title"/>
-          </p:nvPr>
-        </p:nvSpPr>
-        <p:spPr/>
-        <p:txBody>
-          <a:bodyPr/>
-          <a:lstStyle/>
-          <a:p>
-            <a:r>
-              <a:rPr kumimoji="1" lang="ja-JP" altLang="en-US" dirty="0"/>
-              <a:t>大きな変更点</a:t>
-            </a:r>
-          </a:p>
-        </p:txBody>
-      </p:sp>
-      <p:sp>
-        <p:nvSpPr>
-          <p:cNvPr id="3" name="コンテンツ プレースホルダー 2">
-            <a:extLst>
-              <a:ext uri="{FF2B5EF4-FFF2-40B4-BE49-F238E27FC236}">
-                <a16:creationId xmlns:a16="http://schemas.microsoft.com/office/drawing/2014/main" id="{35322F19-2557-4781-A26C-EED4549116D0}"/>
-              </a:ext>
-            </a:extLst>
-          </p:cNvPr>
-          <p:cNvSpPr>
-            <a:spLocks noGrp="1"/>
-          </p:cNvSpPr>
-          <p:nvPr>
-            <p:ph idx="1"/>
-          </p:nvPr>
-        </p:nvSpPr>
-        <p:spPr/>
-        <p:txBody>
-          <a:bodyPr>
-            <a:normAutofit/>
-          </a:bodyPr>
-          <a:lstStyle/>
-          <a:p>
-            <a:r>
-              <a:rPr lang="ja-JP" altLang="en-US" sz="1800" dirty="0"/>
-              <a:t>関数呼び出しによって状態遷移を明確にする</a:t>
-            </a:r>
-            <a:endParaRPr lang="en-US" altLang="ja-JP" sz="1800" dirty="0"/>
-          </a:p>
-          <a:p>
-            <a:pPr lvl="1"/>
-            <a:r>
-              <a:rPr kumimoji="1" lang="en-US" altLang="ja-JP" sz="1800" dirty="0"/>
-              <a:t>response::</a:t>
-            </a:r>
-            <a:r>
-              <a:rPr kumimoji="1" lang="en-US" altLang="ja-JP" sz="1800" dirty="0" err="1"/>
-              <a:t>body_head</a:t>
-            </a:r>
-            <a:r>
-              <a:rPr kumimoji="1" lang="en-US" altLang="ja-JP" sz="1800" dirty="0"/>
-              <a:t>(std::</a:t>
-            </a:r>
-            <a:r>
-              <a:rPr kumimoji="1" lang="en-US" altLang="ja-JP" sz="1800" dirty="0" err="1"/>
-              <a:t>string_view</a:t>
-            </a:r>
-            <a:r>
-              <a:rPr kumimoji="1" lang="en-US" altLang="ja-JP" sz="1800" dirty="0"/>
-              <a:t>)</a:t>
-            </a:r>
-            <a:r>
-              <a:rPr kumimoji="1" lang="ja-JP" altLang="en-US" sz="1800" dirty="0"/>
-              <a:t>を追加し</a:t>
-            </a:r>
-            <a:r>
-              <a:rPr kumimoji="1" lang="en-US" altLang="ja-JP" sz="1800" dirty="0"/>
-              <a:t>ready</a:t>
-            </a:r>
-            <a:r>
-              <a:rPr kumimoji="1" lang="ja-JP" altLang="en-US" sz="1800" dirty="0"/>
-              <a:t>への遷移を通知</a:t>
-            </a:r>
-            <a:endParaRPr lang="en-US" altLang="ja-JP" sz="1800" dirty="0"/>
-          </a:p>
-          <a:p>
-            <a:pPr lvl="2"/>
-            <a:r>
-              <a:rPr kumimoji="1" lang="en-US" altLang="ja-JP" sz="1800" dirty="0"/>
-              <a:t>channel</a:t>
-            </a:r>
-            <a:r>
-              <a:rPr kumimoji="1" lang="ja-JP" altLang="en-US" sz="1800" dirty="0"/>
-              <a:t>名を含む</a:t>
-            </a:r>
-            <a:r>
-              <a:rPr lang="ja-JP" altLang="en-US" sz="1800" dirty="0"/>
-              <a:t>情報</a:t>
-            </a:r>
-            <a:r>
-              <a:rPr lang="en-US" altLang="ja-JP" sz="1800" dirty="0"/>
-              <a:t>(body head)</a:t>
-            </a:r>
-            <a:r>
-              <a:rPr lang="ja-JP" altLang="en-US" sz="1800" dirty="0"/>
-              <a:t>を通知する</a:t>
-            </a:r>
-            <a:endParaRPr lang="en-US" altLang="ja-JP" sz="1800" dirty="0"/>
-          </a:p>
-          <a:p>
-            <a:pPr lvl="3"/>
-            <a:r>
-              <a:rPr lang="en-US" altLang="ja-JP" dirty="0" err="1"/>
-              <a:t>protobuf</a:t>
-            </a:r>
-            <a:r>
-              <a:rPr lang="ja-JP" altLang="en-US" dirty="0"/>
-              <a:t>の</a:t>
-            </a:r>
-            <a:r>
-              <a:rPr lang="en-US" altLang="ja-JP" dirty="0"/>
-              <a:t>response::</a:t>
-            </a:r>
-            <a:r>
-              <a:rPr lang="en-US" altLang="ja-JP" dirty="0" err="1"/>
-              <a:t>ExecuteQuery</a:t>
-            </a:r>
-            <a:r>
-              <a:rPr lang="ja-JP" altLang="en-US" dirty="0"/>
-              <a:t>メッセージ</a:t>
-            </a:r>
-            <a:endParaRPr lang="en-US" altLang="ja-JP" dirty="0"/>
-          </a:p>
-          <a:p>
-            <a:pPr lvl="2"/>
-            <a:r>
-              <a:rPr lang="en-US" altLang="ja-JP" sz="1800" dirty="0"/>
-              <a:t>code()</a:t>
-            </a:r>
-            <a:r>
-              <a:rPr lang="ja-JP" altLang="en-US" sz="1800" dirty="0"/>
-              <a:t>による</a:t>
-            </a:r>
-            <a:r>
-              <a:rPr lang="en-US" altLang="ja-JP" sz="1800" dirty="0" err="1"/>
-              <a:t>response_code</a:t>
-            </a:r>
-            <a:r>
-              <a:rPr lang="en-US" altLang="ja-JP" sz="1800" dirty="0"/>
-              <a:t>::started</a:t>
-            </a:r>
-            <a:r>
-              <a:rPr lang="ja-JP" altLang="en-US" sz="1800" dirty="0"/>
-              <a:t>の通知は不要なので廃止</a:t>
-            </a:r>
-            <a:endParaRPr lang="en-US" altLang="ja-JP" sz="1800" dirty="0"/>
-          </a:p>
-          <a:p>
-            <a:pPr lvl="1"/>
-            <a:r>
-              <a:rPr lang="en-US" altLang="ja-JP" sz="1800" dirty="0"/>
-              <a:t>response::body()</a:t>
-            </a:r>
-            <a:r>
-              <a:rPr lang="ja-JP" altLang="en-US" sz="1800" dirty="0"/>
-              <a:t>は</a:t>
-            </a:r>
-            <a:r>
-              <a:rPr lang="en-US" altLang="ja-JP" sz="1800" dirty="0"/>
-              <a:t>completed</a:t>
-            </a:r>
-            <a:r>
-              <a:rPr lang="ja-JP" altLang="en-US" sz="1800" dirty="0"/>
-              <a:t>への遷移をトリガする</a:t>
-            </a:r>
-            <a:endParaRPr lang="en-US" altLang="ja-JP" sz="1800" dirty="0"/>
-          </a:p>
-          <a:p>
-            <a:pPr lvl="2"/>
-            <a:r>
-              <a:rPr lang="ja-JP" altLang="en-US" sz="1800" dirty="0"/>
-              <a:t>成功の場合もエラーの場合もこのパスで</a:t>
-            </a:r>
-            <a:r>
-              <a:rPr lang="en-US" altLang="ja-JP" sz="1800" dirty="0"/>
-              <a:t>completed</a:t>
-            </a:r>
-            <a:r>
-              <a:rPr lang="ja-JP" altLang="en-US" sz="1800" dirty="0"/>
-              <a:t>へ遷移</a:t>
-            </a:r>
-            <a:endParaRPr lang="en-US" altLang="ja-JP" sz="1800" dirty="0"/>
-          </a:p>
-          <a:p>
-            <a:pPr lvl="3"/>
-            <a:r>
-              <a:rPr lang="ja-JP" altLang="en-US" dirty="0"/>
-              <a:t>成功の場合は</a:t>
-            </a:r>
-            <a:r>
-              <a:rPr lang="en-US" altLang="ja-JP" dirty="0" err="1"/>
-              <a:t>protobuf</a:t>
-            </a:r>
-            <a:r>
-              <a:rPr lang="ja-JP" altLang="en-US" dirty="0"/>
-              <a:t>の</a:t>
-            </a:r>
-            <a:r>
-              <a:rPr lang="en-US" altLang="ja-JP" dirty="0"/>
-              <a:t>response::Response</a:t>
-            </a:r>
-            <a:r>
-              <a:rPr lang="ja-JP" altLang="en-US" dirty="0"/>
-              <a:t>メッセージを送信</a:t>
-            </a:r>
-            <a:endParaRPr lang="en-US" altLang="ja-JP" dirty="0"/>
-          </a:p>
-          <a:p>
-            <a:pPr lvl="3"/>
-            <a:r>
-              <a:rPr lang="ja-JP" altLang="en-US" sz="1600" dirty="0"/>
-              <a:t>エラー時に送信されるものはエラーの起きた位置・種類によって異なる。次ページを参照</a:t>
-            </a:r>
-            <a:endParaRPr lang="en-US" altLang="ja-JP" sz="1600" dirty="0"/>
-          </a:p>
-          <a:p>
-            <a:r>
-              <a:rPr lang="en-US" altLang="ja-JP" sz="1800" dirty="0"/>
-              <a:t>response::message()</a:t>
-            </a:r>
-            <a:r>
-              <a:rPr lang="ja-JP" altLang="en-US" sz="1800" dirty="0"/>
-              <a:t>を廃止 </a:t>
-            </a:r>
-            <a:r>
-              <a:rPr lang="en-US" altLang="ja-JP" sz="1800" dirty="0"/>
-              <a:t>(body()</a:t>
-            </a:r>
-            <a:r>
-              <a:rPr lang="ja-JP" altLang="en-US" sz="1800" dirty="0"/>
-              <a:t>に統合</a:t>
-            </a:r>
-            <a:r>
-              <a:rPr lang="en-US" altLang="ja-JP" sz="1800" dirty="0"/>
-              <a:t>)</a:t>
-            </a:r>
-          </a:p>
-          <a:p>
-            <a:r>
-              <a:rPr lang="en-US" altLang="ja-JP" sz="1800" dirty="0"/>
-              <a:t>response::complete()</a:t>
-            </a:r>
-            <a:r>
-              <a:rPr lang="ja-JP" altLang="en-US" sz="1800" dirty="0"/>
-              <a:t>を廃止</a:t>
-            </a:r>
-            <a:endParaRPr lang="en-US" altLang="ja-JP" sz="1800" dirty="0"/>
-          </a:p>
-          <a:p>
-            <a:pPr lvl="1"/>
-            <a:r>
-              <a:rPr lang="ja-JP" altLang="en-US" sz="1800" dirty="0"/>
-              <a:t>不要な非同期処理をおこなわないことにしたため</a:t>
-            </a:r>
-            <a:endParaRPr lang="en-US" altLang="ja-JP" sz="1800" dirty="0"/>
-          </a:p>
-        </p:txBody>
-      </p:sp>
-    </p:spTree>
-    <p:extLst>
-      <p:ext uri="{BB962C8B-B14F-4D97-AF65-F5344CB8AC3E}">
-        <p14:creationId xmlns:p14="http://schemas.microsoft.com/office/powerpoint/2010/main" val="2026748259"/>
-      </p:ext>
-    </p:extLst>
-  </p:cSld>
-  <p:clrMapOvr>
-    <a:masterClrMapping/>
-  </p:clrMapOvr>
-</p:sld>
-</file>
-
-<file path=ppt/slides/slide4.xml><?xml version="1.0" encoding="utf-8"?>
-<p:sld xmlns:a="http://schemas.openxmlformats.org/drawingml/2006/main" xmlns:r="http://schemas.openxmlformats.org/officeDocument/2006/relationships" xmlns:p="http://schemas.openxmlformats.org/presentationml/2006/main">
-  <p:cSld>
-    <p:spTree>
-      <p:nvGrpSpPr>
-        <p:cNvPr id="1" name=""/>
-        <p:cNvGrpSpPr/>
-        <p:nvPr/>
-      </p:nvGrpSpPr>
-      <p:grpSpPr>
-        <a:xfrm>
-          <a:off x="0" y="0"/>
-          <a:ext cx="0" cy="0"/>
-          <a:chOff x="0" y="0"/>
-          <a:chExt cx="0" cy="0"/>
-        </a:xfrm>
-      </p:grpSpPr>
-      <p:sp>
-        <p:nvSpPr>
-          <p:cNvPr id="2" name="タイトル 1">
-            <a:extLst>
-              <a:ext uri="{FF2B5EF4-FFF2-40B4-BE49-F238E27FC236}">
                 <a16:creationId xmlns:a16="http://schemas.microsoft.com/office/drawing/2014/main" id="{BBF4EA5C-E986-48E3-ADD9-440487D75C8E}"/>
               </a:ext>
             </a:extLst>
@@ -5325,221 +5302,445 @@
           </a:p>
           <a:p>
             <a:r>
-              <a:rPr lang="en-US" altLang="ja-JP" sz="1800" dirty="0"/>
-              <a:t>response::code()</a:t>
-            </a:r>
-            <a:r>
-              <a:rPr lang="ja-JP" altLang="en-US" sz="1800" dirty="0"/>
-              <a:t>の値で区別できる</a:t>
-            </a:r>
-            <a:endParaRPr lang="en-US" altLang="ja-JP" sz="1800" dirty="0"/>
+              <a:rPr lang="en-US" altLang="ja-JP" sz="1800" dirty="0">
+                <a:solidFill>
+                  <a:srgbClr val="FF0000"/>
+                </a:solidFill>
+              </a:rPr>
+              <a:t>response:: body()</a:t>
+            </a:r>
+            <a:r>
+              <a:rPr lang="ja-JP" altLang="en-US" sz="1800" dirty="0">
+                <a:solidFill>
+                  <a:srgbClr val="FF0000"/>
+                </a:solidFill>
+              </a:rPr>
+              <a:t>か</a:t>
+            </a:r>
+            <a:r>
+              <a:rPr lang="en-US" altLang="ja-JP" sz="1800" dirty="0">
+                <a:solidFill>
+                  <a:srgbClr val="FF0000"/>
+                </a:solidFill>
+              </a:rPr>
+              <a:t>response::error()</a:t>
+            </a:r>
+            <a:r>
+              <a:rPr lang="ja-JP" altLang="en-US" sz="1800" dirty="0">
+                <a:solidFill>
+                  <a:srgbClr val="FF0000"/>
+                </a:solidFill>
+              </a:rPr>
+              <a:t>のいずれが呼び出されたかで区別する</a:t>
+            </a:r>
+            <a:endParaRPr lang="en-US" altLang="ja-JP" sz="1800" dirty="0">
+              <a:solidFill>
+                <a:srgbClr val="FF0000"/>
+              </a:solidFill>
+            </a:endParaRPr>
           </a:p>
           <a:p>
             <a:pPr lvl="1"/>
             <a:r>
-              <a:rPr lang="en-US" altLang="ja-JP" sz="1800" dirty="0" err="1"/>
+              <a:rPr lang="en-US" altLang="ja-JP" sz="1800" dirty="0">
+                <a:solidFill>
+                  <a:srgbClr val="FF0000"/>
+                </a:solidFill>
+              </a:rPr>
+              <a:t>response:: body()</a:t>
+            </a:r>
+            <a:r>
+              <a:rPr lang="ja-JP" altLang="en-US" sz="1800" dirty="0">
+                <a:solidFill>
+                  <a:srgbClr val="FF0000"/>
+                </a:solidFill>
+              </a:rPr>
+              <a:t> </a:t>
+            </a:r>
+            <a:r>
+              <a:rPr lang="en-US" altLang="ja-JP" sz="1800" dirty="0">
+                <a:solidFill>
+                  <a:srgbClr val="FF0000"/>
+                </a:solidFill>
+              </a:rPr>
+              <a:t>-&gt;</a:t>
+            </a:r>
+            <a:r>
+              <a:rPr lang="ja-JP" altLang="en-US" sz="1800" dirty="0">
+                <a:solidFill>
+                  <a:srgbClr val="FF0000"/>
+                </a:solidFill>
+              </a:rPr>
+              <a:t> 成功</a:t>
+            </a:r>
+            <a:endParaRPr lang="en-US" altLang="ja-JP" sz="1800" dirty="0">
+              <a:solidFill>
+                <a:srgbClr val="FF0000"/>
+              </a:solidFill>
+            </a:endParaRPr>
+          </a:p>
+          <a:p>
+            <a:pPr lvl="1"/>
+            <a:r>
+              <a:rPr lang="en-US" altLang="ja-JP" sz="1800" dirty="0">
+                <a:solidFill>
+                  <a:srgbClr val="FF0000"/>
+                </a:solidFill>
+              </a:rPr>
+              <a:t>response::error()</a:t>
+            </a:r>
+            <a:r>
+              <a:rPr lang="ja-JP" altLang="en-US" sz="1800" dirty="0">
+                <a:solidFill>
+                  <a:srgbClr val="FF0000"/>
+                </a:solidFill>
+              </a:rPr>
+              <a:t> </a:t>
+            </a:r>
+            <a:r>
+              <a:rPr lang="en-US" altLang="ja-JP" sz="1800" dirty="0">
+                <a:solidFill>
+                  <a:srgbClr val="FF0000"/>
+                </a:solidFill>
+              </a:rPr>
+              <a:t>-&gt; </a:t>
+            </a:r>
+            <a:r>
+              <a:rPr lang="ja-JP" altLang="en-US" sz="1800" dirty="0">
+                <a:solidFill>
+                  <a:srgbClr val="FF0000"/>
+                </a:solidFill>
+              </a:rPr>
+              <a:t>エラー</a:t>
+            </a:r>
+            <a:endParaRPr lang="en-US" altLang="ja-JP" sz="1800" dirty="0">
+              <a:solidFill>
+                <a:srgbClr val="FF0000"/>
+              </a:solidFill>
+            </a:endParaRPr>
+          </a:p>
+          <a:p>
+            <a:r>
+              <a:rPr kumimoji="1" lang="ja-JP" altLang="en-US" sz="1800" dirty="0">
+                <a:solidFill>
+                  <a:srgbClr val="FF0000"/>
+                </a:solidFill>
+              </a:rPr>
+              <a:t>エラーの場合</a:t>
+            </a:r>
+            <a:r>
+              <a:rPr kumimoji="1" lang="en-US" altLang="ja-JP" sz="1800" dirty="0">
+                <a:solidFill>
+                  <a:srgbClr val="FF0000"/>
+                </a:solidFill>
+              </a:rPr>
+              <a:t>(</a:t>
+            </a:r>
+            <a:r>
+              <a:rPr kumimoji="1" lang="en-US" altLang="ja-JP" sz="1800" dirty="0" err="1">
+                <a:solidFill>
+                  <a:srgbClr val="FF0000"/>
+                </a:solidFill>
+              </a:rPr>
+              <a:t>tateyama</a:t>
+            </a:r>
+            <a:r>
+              <a:rPr kumimoji="1" lang="ja-JP" altLang="en-US" sz="1800" dirty="0">
+                <a:solidFill>
+                  <a:srgbClr val="FF0000"/>
+                </a:solidFill>
+              </a:rPr>
+              <a:t>レイヤでのエラー</a:t>
+            </a:r>
+            <a:r>
+              <a:rPr kumimoji="1" lang="en-US" altLang="ja-JP" sz="1800" dirty="0">
+                <a:solidFill>
+                  <a:srgbClr val="FF0000"/>
+                </a:solidFill>
+              </a:rPr>
+              <a:t>)</a:t>
+            </a:r>
+          </a:p>
+          <a:p>
+            <a:pPr lvl="1"/>
+            <a:r>
+              <a:rPr kumimoji="1" lang="en-US" altLang="ja-JP" sz="1800" dirty="0">
+                <a:solidFill>
+                  <a:srgbClr val="FF0000"/>
+                </a:solidFill>
+              </a:rPr>
+              <a:t>response::error()</a:t>
+            </a:r>
+            <a:r>
+              <a:rPr kumimoji="1" lang="ja-JP" altLang="en-US" sz="1800" dirty="0">
+                <a:solidFill>
+                  <a:srgbClr val="FF0000"/>
+                </a:solidFill>
+              </a:rPr>
+              <a:t>の値が利用可能 </a:t>
+            </a:r>
+            <a:r>
+              <a:rPr kumimoji="1" lang="en-US" altLang="ja-JP" sz="1800" dirty="0">
+                <a:solidFill>
+                  <a:srgbClr val="FF0000"/>
+                </a:solidFill>
+              </a:rPr>
+              <a:t>(core diagnostics)</a:t>
+            </a:r>
+          </a:p>
+          <a:p>
+            <a:r>
+              <a:rPr lang="ja-JP" altLang="en-US" sz="1800" dirty="0">
+                <a:solidFill>
+                  <a:srgbClr val="FF0000"/>
+                </a:solidFill>
+              </a:rPr>
+              <a:t>サービス</a:t>
+            </a:r>
+            <a:r>
+              <a:rPr kumimoji="1" lang="ja-JP" altLang="en-US" sz="1800" dirty="0">
+                <a:solidFill>
+                  <a:srgbClr val="FF0000"/>
+                </a:solidFill>
+              </a:rPr>
+              <a:t>レイヤ</a:t>
+            </a:r>
+            <a:r>
+              <a:rPr kumimoji="1" lang="en-US" altLang="ja-JP" sz="1800" dirty="0">
+                <a:solidFill>
+                  <a:srgbClr val="FF0000"/>
+                </a:solidFill>
+              </a:rPr>
+              <a:t>(</a:t>
+            </a:r>
+            <a:r>
+              <a:rPr kumimoji="1" lang="en-US" altLang="ja-JP" sz="1800" dirty="0" err="1">
+                <a:solidFill>
+                  <a:srgbClr val="FF0000"/>
+                </a:solidFill>
+              </a:rPr>
+              <a:t>jogasaki</a:t>
+            </a:r>
+            <a:r>
+              <a:rPr lang="ja-JP" altLang="en-US" sz="1800" dirty="0">
+                <a:solidFill>
+                  <a:srgbClr val="FF0000"/>
+                </a:solidFill>
+              </a:rPr>
+              <a:t>等</a:t>
+            </a:r>
+            <a:r>
+              <a:rPr lang="en-US" altLang="ja-JP" sz="1800" dirty="0">
+                <a:solidFill>
+                  <a:srgbClr val="FF0000"/>
+                </a:solidFill>
+              </a:rPr>
+              <a:t>)</a:t>
+            </a:r>
+            <a:r>
+              <a:rPr kumimoji="1" lang="ja-JP" altLang="en-US" sz="1800" dirty="0">
+                <a:solidFill>
+                  <a:srgbClr val="FF0000"/>
+                </a:solidFill>
+              </a:rPr>
+              <a:t>でのエラーは</a:t>
+            </a:r>
+            <a:r>
+              <a:rPr kumimoji="1" lang="en-US" altLang="ja-JP" sz="1800" dirty="0">
+                <a:solidFill>
+                  <a:srgbClr val="FF0000"/>
+                </a:solidFill>
+              </a:rPr>
+              <a:t>response::body()</a:t>
+            </a:r>
+            <a:r>
+              <a:rPr kumimoji="1" lang="ja-JP" altLang="en-US" sz="1800" dirty="0">
+                <a:solidFill>
+                  <a:srgbClr val="FF0000"/>
+                </a:solidFill>
+              </a:rPr>
+              <a:t>で戻し成功扱いとする</a:t>
+            </a:r>
+            <a:endParaRPr kumimoji="1" lang="en-US" altLang="ja-JP" sz="1800" dirty="0">
+              <a:solidFill>
+                <a:srgbClr val="FF0000"/>
+              </a:solidFill>
+            </a:endParaRPr>
+          </a:p>
+          <a:p>
+            <a:pPr lvl="1"/>
+            <a:r>
+              <a:rPr lang="en-US" altLang="ja-JP" sz="1800" dirty="0" err="1">
+                <a:solidFill>
+                  <a:srgbClr val="FF0000"/>
+                </a:solidFill>
+              </a:rPr>
+              <a:t>tateyama</a:t>
+            </a:r>
+            <a:r>
+              <a:rPr lang="ja-JP" altLang="en-US" sz="1800" dirty="0">
+                <a:solidFill>
+                  <a:srgbClr val="FF0000"/>
+                </a:solidFill>
+              </a:rPr>
+              <a:t>がハンドルすべきエラーではないため</a:t>
+            </a:r>
+            <a:endParaRPr kumimoji="1" lang="en-US" altLang="ja-JP" sz="1800" dirty="0">
+              <a:solidFill>
+                <a:srgbClr val="FF0000"/>
+              </a:solidFill>
+            </a:endParaRPr>
+          </a:p>
+          <a:p>
+            <a:pPr lvl="1"/>
+            <a:r>
+              <a:rPr lang="ja-JP" altLang="en-US" sz="1800" dirty="0">
+                <a:solidFill>
+                  <a:srgbClr val="FF0000"/>
+                </a:solidFill>
+              </a:rPr>
+              <a:t>以前は</a:t>
+            </a:r>
+            <a:r>
+              <a:rPr lang="en-US" altLang="ja-JP" sz="1800" dirty="0">
+                <a:solidFill>
+                  <a:srgbClr val="FF0000"/>
+                </a:solidFill>
+              </a:rPr>
+              <a:t>response::code() </a:t>
+            </a:r>
+            <a:r>
+              <a:rPr lang="ja-JP" altLang="en-US" sz="1800" dirty="0">
+                <a:solidFill>
+                  <a:srgbClr val="FF0000"/>
+                </a:solidFill>
+              </a:rPr>
+              <a:t>で</a:t>
+            </a:r>
+            <a:r>
+              <a:rPr lang="en-US" altLang="ja-JP" sz="1800" dirty="0" err="1">
+                <a:solidFill>
+                  <a:srgbClr val="FF0000"/>
+                </a:solidFill>
+              </a:rPr>
               <a:t>response_code</a:t>
             </a:r>
             <a:r>
-              <a:rPr lang="en-US" altLang="ja-JP" sz="1800" dirty="0"/>
-              <a:t>::ok</a:t>
-            </a:r>
-            <a:r>
-              <a:rPr lang="ja-JP" altLang="en-US" sz="1800" dirty="0"/>
-              <a:t> </a:t>
-            </a:r>
-            <a:r>
-              <a:rPr lang="en-US" altLang="ja-JP" sz="1800" dirty="0"/>
-              <a:t>-&gt;</a:t>
-            </a:r>
-            <a:r>
-              <a:rPr lang="ja-JP" altLang="en-US" sz="1800" dirty="0"/>
-              <a:t> 成功</a:t>
-            </a:r>
-            <a:endParaRPr lang="en-US" altLang="ja-JP" sz="1800" dirty="0"/>
-          </a:p>
-          <a:p>
-            <a:pPr lvl="1"/>
-            <a:r>
-              <a:rPr lang="ja-JP" altLang="en-US" sz="1800" dirty="0"/>
-              <a:t>上記以外 </a:t>
-            </a:r>
-            <a:r>
-              <a:rPr lang="en-US" altLang="ja-JP" sz="1800" dirty="0"/>
-              <a:t>-&gt; </a:t>
-            </a:r>
-            <a:r>
-              <a:rPr lang="ja-JP" altLang="en-US" sz="1800" dirty="0"/>
-              <a:t>エラー</a:t>
-            </a:r>
-            <a:endParaRPr lang="en-US" altLang="ja-JP" sz="1800" dirty="0"/>
-          </a:p>
-          <a:p>
-            <a:r>
-              <a:rPr kumimoji="1" lang="ja-JP" altLang="en-US" sz="1800" dirty="0"/>
-              <a:t>エラーの場合</a:t>
-            </a:r>
-            <a:endParaRPr kumimoji="1" lang="en-US" altLang="ja-JP" sz="1800" dirty="0"/>
-          </a:p>
-          <a:p>
-            <a:pPr lvl="1"/>
-            <a:r>
-              <a:rPr kumimoji="1" lang="en-US" altLang="ja-JP" sz="1800" dirty="0"/>
-              <a:t>response::body()</a:t>
-            </a:r>
-            <a:r>
-              <a:rPr kumimoji="1" lang="ja-JP" altLang="en-US" sz="1800" dirty="0"/>
-              <a:t>の値が利用可能</a:t>
-            </a:r>
-            <a:endParaRPr kumimoji="1" lang="en-US" altLang="ja-JP" sz="1800" dirty="0"/>
-          </a:p>
-          <a:p>
-            <a:pPr lvl="2"/>
-            <a:r>
-              <a:rPr kumimoji="1" lang="en-US" altLang="ja-JP" sz="1800" dirty="0" err="1"/>
-              <a:t>jogasaki</a:t>
-            </a:r>
-            <a:r>
-              <a:rPr lang="ja-JP" altLang="en-US" sz="1800" dirty="0"/>
-              <a:t>レイヤでのエラーが起きた場合</a:t>
-            </a:r>
-            <a:endParaRPr lang="en-US" altLang="ja-JP" sz="1800" dirty="0"/>
-          </a:p>
-          <a:p>
-            <a:pPr lvl="3"/>
-            <a:r>
-              <a:rPr lang="en-US" altLang="ja-JP" dirty="0"/>
-              <a:t>body</a:t>
-            </a:r>
-            <a:r>
-              <a:rPr lang="ja-JP" altLang="en-US" dirty="0"/>
-              <a:t>に詳細が入る</a:t>
-            </a:r>
-            <a:endParaRPr lang="en-US" altLang="ja-JP" dirty="0"/>
-          </a:p>
-          <a:p>
-            <a:pPr lvl="4"/>
-            <a:r>
-              <a:rPr lang="en-US" altLang="ja-JP" dirty="0" err="1"/>
-              <a:t>protobuf</a:t>
-            </a:r>
-            <a:r>
-              <a:rPr lang="ja-JP" altLang="en-US" dirty="0"/>
-              <a:t>の</a:t>
-            </a:r>
-            <a:r>
-              <a:rPr lang="en-US" altLang="ja-JP" dirty="0"/>
-              <a:t>response::Response</a:t>
-            </a:r>
-            <a:r>
-              <a:rPr lang="ja-JP" altLang="en-US" dirty="0"/>
-              <a:t>メッセージ</a:t>
-            </a:r>
-            <a:endParaRPr lang="en-US" altLang="ja-JP" dirty="0"/>
-          </a:p>
-          <a:p>
-            <a:pPr lvl="3"/>
-            <a:r>
-              <a:rPr lang="en-US" altLang="ja-JP" dirty="0"/>
-              <a:t>code</a:t>
-            </a:r>
-            <a:r>
-              <a:rPr lang="ja-JP" altLang="en-US" dirty="0"/>
+              <a:rPr lang="en-US" altLang="ja-JP" sz="1800" dirty="0">
+                <a:solidFill>
+                  <a:srgbClr val="FF0000"/>
+                </a:solidFill>
+              </a:rPr>
+              <a:t>::</a:t>
+            </a:r>
+            <a:r>
+              <a:rPr lang="en-US" altLang="ja-JP" sz="1800" dirty="0" err="1">
+                <a:solidFill>
+                  <a:srgbClr val="FF0000"/>
+                </a:solidFill>
+              </a:rPr>
+              <a:t>application_error</a:t>
+            </a:r>
+            <a:r>
+              <a:rPr lang="ja-JP" altLang="en-US" sz="1800" dirty="0">
+                <a:solidFill>
+                  <a:srgbClr val="FF0000"/>
+                </a:solidFill>
+              </a:rPr>
+              <a:t>を戻していたが、</a:t>
+            </a:r>
+            <a:r>
+              <a:rPr lang="en-US" altLang="ja-JP" sz="1800" dirty="0">
+                <a:solidFill>
+                  <a:srgbClr val="FF0000"/>
+                </a:solidFill>
+              </a:rPr>
+              <a:t> response::code()</a:t>
+            </a:r>
+            <a:r>
+              <a:rPr lang="ja-JP" altLang="en-US" sz="1800" dirty="0">
+                <a:solidFill>
+                  <a:srgbClr val="FF0000"/>
+                </a:solidFill>
+              </a:rPr>
               <a:t>は</a:t>
             </a:r>
             <a:r>
-              <a:rPr lang="en-US" altLang="ja-JP" dirty="0" err="1"/>
-              <a:t>response_code</a:t>
-            </a:r>
-            <a:r>
-              <a:rPr lang="en-US" altLang="ja-JP" dirty="0"/>
-              <a:t>::</a:t>
-            </a:r>
-            <a:r>
-              <a:rPr lang="en-US" altLang="ja-JP" dirty="0" err="1"/>
-              <a:t>application_error</a:t>
-            </a:r>
-            <a:endParaRPr lang="en-US" altLang="ja-JP" dirty="0"/>
-          </a:p>
-          <a:p>
-            <a:pPr lvl="2"/>
-            <a:r>
-              <a:rPr kumimoji="1" lang="ja-JP" altLang="en-US" sz="1800" dirty="0"/>
-              <a:t>それ以外の場合</a:t>
-            </a:r>
-            <a:r>
-              <a:rPr kumimoji="1" lang="en-US" altLang="ja-JP" sz="1800" dirty="0"/>
-              <a:t>(</a:t>
-            </a:r>
-            <a:r>
-              <a:rPr kumimoji="1" lang="en-US" altLang="ja-JP" sz="1800" dirty="0" err="1"/>
-              <a:t>tateyama</a:t>
-            </a:r>
-            <a:r>
-              <a:rPr kumimoji="1" lang="ja-JP" altLang="en-US" sz="1800" dirty="0"/>
-              <a:t>レイヤでのエラー</a:t>
-            </a:r>
-            <a:r>
-              <a:rPr kumimoji="1" lang="en-US" altLang="ja-JP" sz="1800" dirty="0"/>
-              <a:t>)</a:t>
-            </a:r>
-          </a:p>
-          <a:p>
-            <a:pPr lvl="3"/>
-            <a:r>
-              <a:rPr lang="en-US" altLang="ja-JP" dirty="0"/>
-              <a:t>body</a:t>
-            </a:r>
-            <a:r>
-              <a:rPr lang="ja-JP" altLang="en-US" dirty="0"/>
-              <a:t>にエラーメッセージが入る</a:t>
-            </a:r>
-            <a:r>
-              <a:rPr lang="en-US" altLang="ja-JP" dirty="0"/>
-              <a:t>(</a:t>
-            </a:r>
-            <a:r>
-              <a:rPr lang="ja-JP" altLang="en-US" dirty="0"/>
-              <a:t>プレーンテキスト</a:t>
-            </a:r>
-            <a:r>
-              <a:rPr lang="en-US" altLang="ja-JP" dirty="0"/>
-              <a:t>)</a:t>
-            </a:r>
-          </a:p>
-          <a:p>
-            <a:pPr lvl="3"/>
-            <a:r>
-              <a:rPr kumimoji="1" lang="en-US" altLang="ja-JP" dirty="0"/>
-              <a:t>code</a:t>
-            </a:r>
-            <a:r>
-              <a:rPr kumimoji="1" lang="ja-JP" altLang="en-US" dirty="0"/>
-              <a:t>は</a:t>
-            </a:r>
-            <a:r>
-              <a:rPr lang="en-US" altLang="ja-JP" dirty="0" err="1"/>
-              <a:t>response_code</a:t>
-            </a:r>
-            <a:r>
-              <a:rPr lang="en-US" altLang="ja-JP" dirty="0"/>
-              <a:t>::</a:t>
-            </a:r>
-            <a:r>
-              <a:rPr lang="en-US" altLang="ja-JP" dirty="0" err="1"/>
-              <a:t>application_error</a:t>
-            </a:r>
-            <a:r>
-              <a:rPr lang="ja-JP" altLang="en-US" dirty="0"/>
-              <a:t>以外の値</a:t>
-            </a:r>
-            <a:endParaRPr kumimoji="1" lang="en-US" altLang="ja-JP" dirty="0"/>
-          </a:p>
-          <a:p>
-            <a:endParaRPr kumimoji="1" lang="en-US" altLang="ja-JP" sz="1800" dirty="0"/>
+              <a:rPr lang="en-US" altLang="ja-JP" sz="1800" dirty="0">
+                <a:solidFill>
+                  <a:srgbClr val="FF0000"/>
+                </a:solidFill>
+              </a:rPr>
+              <a:t>error()</a:t>
+            </a:r>
+            <a:r>
+              <a:rPr lang="ja-JP" altLang="en-US" sz="1800" dirty="0">
+                <a:solidFill>
+                  <a:srgbClr val="FF0000"/>
+                </a:solidFill>
+              </a:rPr>
+              <a:t>と重複するので廃止</a:t>
+            </a:r>
+            <a:endParaRPr kumimoji="1" lang="en-US" altLang="ja-JP" sz="1800" dirty="0">
+              <a:solidFill>
+                <a:srgbClr val="FF0000"/>
+              </a:solidFill>
+            </a:endParaRPr>
           </a:p>
           <a:p>
             <a:endParaRPr kumimoji="1" lang="ja-JP" altLang="en-US" sz="1800" dirty="0"/>
+          </a:p>
+        </p:txBody>
+      </p:sp>
+      <p:sp>
+        <p:nvSpPr>
+          <p:cNvPr id="4" name="テキスト ボックス 3">
+            <a:extLst>
+              <a:ext uri="{FF2B5EF4-FFF2-40B4-BE49-F238E27FC236}">
+                <a16:creationId xmlns:a16="http://schemas.microsoft.com/office/drawing/2014/main" id="{C94B0515-EAB6-7071-B75D-08DED58E8F02}"/>
+              </a:ext>
+            </a:extLst>
+          </p:cNvPr>
+          <p:cNvSpPr txBox="1"/>
+          <p:nvPr/>
+        </p:nvSpPr>
+        <p:spPr>
+          <a:xfrm>
+            <a:off x="135660" y="6374813"/>
+            <a:ext cx="5900879" cy="276999"/>
+          </a:xfrm>
+          <a:prstGeom prst="rect">
+            <a:avLst/>
+          </a:prstGeom>
+          <a:noFill/>
+        </p:spPr>
+        <p:txBody>
+          <a:bodyPr wrap="square" rtlCol="0">
+            <a:spAutoFit/>
+          </a:bodyPr>
+          <a:lstStyle/>
+          <a:p>
+            <a:r>
+              <a:rPr lang="en-US" altLang="ja-JP" sz="1200" dirty="0">
+                <a:solidFill>
+                  <a:srgbClr val="FF0000"/>
+                </a:solidFill>
+              </a:rPr>
+              <a:t>response::error()</a:t>
+            </a:r>
+            <a:r>
+              <a:rPr lang="ja-JP" altLang="en-US" sz="1200" dirty="0">
+                <a:solidFill>
+                  <a:srgbClr val="FF0000"/>
+                </a:solidFill>
+              </a:rPr>
+              <a:t>の追加による変更を赤字で示す</a:t>
+            </a:r>
+            <a:endParaRPr kumimoji="1" lang="ja-JP" altLang="en-US" sz="1200" dirty="0">
+              <a:solidFill>
+                <a:srgbClr val="FF0000"/>
+              </a:solidFill>
+            </a:endParaRPr>
           </a:p>
         </p:txBody>
       </p:sp>
@@ -5556,7 +5757,7 @@
 </p:sld>
 </file>
 
-<file path=ppt/slides/slide5.xml><?xml version="1.0" encoding="utf-8"?>
+<file path=ppt/slides/slide4.xml><?xml version="1.0" encoding="utf-8"?>
 <p:sld xmlns:a="http://schemas.openxmlformats.org/drawingml/2006/main" xmlns:r="http://schemas.openxmlformats.org/officeDocument/2006/relationships" xmlns:p="http://schemas.openxmlformats.org/presentationml/2006/main">
   <p:cSld>
     <p:spTree>

</xml_diff>